<commit_message>
commit lecture 14 and project
</commit_message>
<xml_diff>
--- a/pythonBeginnerLecture/PythonPart13.pptx
+++ b/pythonBeginnerLecture/PythonPart13.pptx
@@ -269,7 +269,7 @@
           <a:p>
             <a:fld id="{C075C123-D6CD-4046-9E13-CA7186604EF0}" type="datetimeFigureOut">
               <a:rPr lang="zh-CN" altLang="en-US" smtClean="0"/>
-              <a:t>2021/4/3</a:t>
+              <a:t>2021/4/11</a:t>
             </a:fld>
             <a:endParaRPr lang="zh-CN" altLang="en-US"/>
           </a:p>
@@ -434,7 +434,7 @@
           <a:p>
             <a:fld id="{9E26DC34-D585-42D5-89F7-991AD639A885}" type="datetimeFigureOut">
               <a:rPr lang="zh-CN" altLang="en-US" smtClean="0"/>
-              <a:t>2021/4/3</a:t>
+              <a:t>2021/4/11</a:t>
             </a:fld>
             <a:endParaRPr lang="zh-CN" altLang="en-US"/>
           </a:p>
@@ -17116,7 +17116,7 @@
           </a:ln>
           <a:extLst>
             <a:ext uri="{C572A759-6A51-4108-AA02-DFA0A04FC94B}">
-              <ma14:wrappingTextBoxFlag xmlns="" xmlns:ma14="http://schemas.microsoft.com/office/mac/drawingml/2011/main" val="1"/>
+              <ma14:wrappingTextBoxFlag xmlns:ma14="http://schemas.microsoft.com/office/mac/drawingml/2011/main" xmlns="" val="1"/>
             </a:ext>
           </a:extLst>
         </p:spPr>
@@ -25951,26 +25951,6 @@
                   <a:srgbClr val="00FF00"/>
                 </a:highlight>
               </a:rPr>
-              <a:t>David                    10 Mins</a:t>
-            </a:r>
-          </a:p>
-          <a:p>
-            <a:pPr marL="457200" indent="-457200">
-              <a:lnSpc>
-                <a:spcPct val="150000"/>
-              </a:lnSpc>
-              <a:buFont typeface="+mj-lt"/>
-              <a:buAutoNum type="arabicPeriod"/>
-            </a:pPr>
-            <a:r>
-              <a:rPr lang="en-CA" sz="2400" dirty="0">
-                <a:solidFill>
-                  <a:srgbClr val="FF0000"/>
-                </a:solidFill>
-                <a:highlight>
-                  <a:srgbClr val="00FF00"/>
-                </a:highlight>
-              </a:rPr>
               <a:t>Vincent                10 Mins              </a:t>
             </a:r>
           </a:p>
@@ -26044,14 +26024,26 @@
               </a:rPr>
               <a:t>Helen                   10 Mins</a:t>
             </a:r>
-            <a:endParaRPr lang="en-US" sz="2400" dirty="0">
-              <a:solidFill>
-                <a:srgbClr val="FF0000"/>
-              </a:solidFill>
-              <a:highlight>
-                <a:srgbClr val="00FF00"/>
-              </a:highlight>
-            </a:endParaRPr>
+          </a:p>
+          <a:p>
+            <a:pPr marL="457200" indent="-457200">
+              <a:lnSpc>
+                <a:spcPct val="150000"/>
+              </a:lnSpc>
+              <a:buFont typeface="+mj-lt"/>
+              <a:buAutoNum type="arabicPeriod"/>
+            </a:pPr>
+            <a:r>
+              <a:rPr lang="en-CA" sz="2400" dirty="0">
+                <a:solidFill>
+                  <a:srgbClr val="FF0000"/>
+                </a:solidFill>
+                <a:highlight>
+                  <a:srgbClr val="00FF00"/>
+                </a:highlight>
+              </a:rPr>
+              <a:t>David                    10 Mins</a:t>
+            </a:r>
           </a:p>
         </p:txBody>
       </p:sp>
@@ -36735,7 +36727,7 @@
           </a:ln>
           <a:extLst>
             <a:ext uri="{C572A759-6A51-4108-AA02-DFA0A04FC94B}">
-              <ma14:wrappingTextBoxFlag xmlns:ma14="http://schemas.microsoft.com/office/mac/drawingml/2011/main" xmlns="" val="1"/>
+              <ma14:wrappingTextBoxFlag xmlns="" xmlns:ma14="http://schemas.microsoft.com/office/mac/drawingml/2011/main" val="1"/>
             </a:ext>
           </a:extLst>
         </p:spPr>
@@ -37063,7 +37055,7 @@
           </a:ln>
           <a:extLst>
             <a:ext uri="{C572A759-6A51-4108-AA02-DFA0A04FC94B}">
-              <ma14:wrappingTextBoxFlag xmlns="" xmlns:ma14="http://schemas.microsoft.com/office/mac/drawingml/2011/main" val="1"/>
+              <ma14:wrappingTextBoxFlag xmlns:ma14="http://schemas.microsoft.com/office/mac/drawingml/2011/main" xmlns="" val="1"/>
             </a:ext>
           </a:extLst>
         </p:spPr>

</xml_diff>